<commit_message>
RDS endpoint not working
If you use the VPC module something doesn't work right. It is impossible 
to well solve DNS DB name (neither with VPC endpoint nor with Route53). 
However the original RDS enpoint still works.
</commit_message>
<xml_diff>
--- a/terraform_test_AWS/Loadbalancer/images/architecture.pptx
+++ b/terraform_test_AWS/Loadbalancer/images/architecture.pptx
@@ -5646,7 +5646,7 @@
           <p:nvPr>
             <p:extLst>
               <p:ext uri="{D42A27DB-BD31-4B8C-83A1-F6EECF244321}">
-                <p14:modId xmlns:p14="http://schemas.microsoft.com/office/powerpoint/2010/main" val="200514668"/>
+                <p14:modId xmlns:p14="http://schemas.microsoft.com/office/powerpoint/2010/main" val="3244105760"/>
               </p:ext>
             </p:extLst>
           </p:nvPr>
@@ -5658,8 +5658,8 @@
         <a:graphic>
           <a:graphicData uri="http://schemas.openxmlformats.org/drawingml/2006/table">
             <a:tbl>
-              <a:tblPr firstRow="1" bandRow="1">
-                <a:tableStyleId>{073A0DAA-6AF3-43AB-8588-CEC1D06C72B9}</a:tableStyleId>
+              <a:tblPr bandRow="1">
+                <a:tableStyleId>{D7AC3CCA-C797-4891-BE02-D94E43425B78}</a:tableStyleId>
               </a:tblPr>
               <a:tblGrid>
                 <a:gridCol w="978484">

</xml_diff>